<commit_message>
Update 23 & 110
</commit_message>
<xml_diff>
--- a/110殿中敬拜.pptx
+++ b/110殿中敬拜.pptx
@@ -311,7 +311,7 @@
             <a:fld id="{86B5546F-C09B-4E63-ABC5-F7C86A7E8D66}" type="datetimeFigureOut">
               <a:rPr lang="en-US" smtClean="0"/>
               <a:pPr/>
-              <a:t>7/15/2020</a:t>
+              <a:t>10/23/2021</a:t>
             </a:fld>
             <a:endParaRPr lang="en-US"/>
           </a:p>
@@ -483,7 +483,7 @@
             <a:fld id="{86B5546F-C09B-4E63-ABC5-F7C86A7E8D66}" type="datetimeFigureOut">
               <a:rPr lang="en-US" smtClean="0"/>
               <a:pPr/>
-              <a:t>7/15/2020</a:t>
+              <a:t>10/23/2021</a:t>
             </a:fld>
             <a:endParaRPr lang="en-US"/>
           </a:p>
@@ -665,7 +665,7 @@
             <a:fld id="{86B5546F-C09B-4E63-ABC5-F7C86A7E8D66}" type="datetimeFigureOut">
               <a:rPr lang="en-US" smtClean="0"/>
               <a:pPr/>
-              <a:t>7/15/2020</a:t>
+              <a:t>10/23/2021</a:t>
             </a:fld>
             <a:endParaRPr lang="en-US"/>
           </a:p>
@@ -837,7 +837,7 @@
             <a:fld id="{86B5546F-C09B-4E63-ABC5-F7C86A7E8D66}" type="datetimeFigureOut">
               <a:rPr lang="en-US" smtClean="0"/>
               <a:pPr/>
-              <a:t>7/15/2020</a:t>
+              <a:t>10/23/2021</a:t>
             </a:fld>
             <a:endParaRPr lang="en-US"/>
           </a:p>
@@ -1085,7 +1085,7 @@
             <a:fld id="{86B5546F-C09B-4E63-ABC5-F7C86A7E8D66}" type="datetimeFigureOut">
               <a:rPr lang="en-US" smtClean="0"/>
               <a:pPr/>
-              <a:t>7/15/2020</a:t>
+              <a:t>10/23/2021</a:t>
             </a:fld>
             <a:endParaRPr lang="en-US"/>
           </a:p>
@@ -1375,7 +1375,7 @@
             <a:fld id="{86B5546F-C09B-4E63-ABC5-F7C86A7E8D66}" type="datetimeFigureOut">
               <a:rPr lang="en-US" smtClean="0"/>
               <a:pPr/>
-              <a:t>7/15/2020</a:t>
+              <a:t>10/23/2021</a:t>
             </a:fld>
             <a:endParaRPr lang="en-US"/>
           </a:p>
@@ -1799,7 +1799,7 @@
             <a:fld id="{86B5546F-C09B-4E63-ABC5-F7C86A7E8D66}" type="datetimeFigureOut">
               <a:rPr lang="en-US" smtClean="0"/>
               <a:pPr/>
-              <a:t>7/15/2020</a:t>
+              <a:t>10/23/2021</a:t>
             </a:fld>
             <a:endParaRPr lang="en-US"/>
           </a:p>
@@ -1919,7 +1919,7 @@
             <a:fld id="{86B5546F-C09B-4E63-ABC5-F7C86A7E8D66}" type="datetimeFigureOut">
               <a:rPr lang="en-US" smtClean="0"/>
               <a:pPr/>
-              <a:t>7/15/2020</a:t>
+              <a:t>10/23/2021</a:t>
             </a:fld>
             <a:endParaRPr lang="en-US"/>
           </a:p>
@@ -2016,7 +2016,7 @@
             <a:fld id="{86B5546F-C09B-4E63-ABC5-F7C86A7E8D66}" type="datetimeFigureOut">
               <a:rPr lang="en-US" smtClean="0"/>
               <a:pPr/>
-              <a:t>7/15/2020</a:t>
+              <a:t>10/23/2021</a:t>
             </a:fld>
             <a:endParaRPr lang="en-US"/>
           </a:p>
@@ -2295,7 +2295,7 @@
             <a:fld id="{86B5546F-C09B-4E63-ABC5-F7C86A7E8D66}" type="datetimeFigureOut">
               <a:rPr lang="en-US" smtClean="0"/>
               <a:pPr/>
-              <a:t>7/15/2020</a:t>
+              <a:t>10/23/2021</a:t>
             </a:fld>
             <a:endParaRPr lang="en-US"/>
           </a:p>
@@ -2554,7 +2554,7 @@
             <a:fld id="{86B5546F-C09B-4E63-ABC5-F7C86A7E8D66}" type="datetimeFigureOut">
               <a:rPr lang="en-US" smtClean="0"/>
               <a:pPr/>
-              <a:t>7/15/2020</a:t>
+              <a:t>10/23/2021</a:t>
             </a:fld>
             <a:endParaRPr lang="en-US"/>
           </a:p>
@@ -2774,7 +2774,7 @@
             <a:fld id="{86B5546F-C09B-4E63-ABC5-F7C86A7E8D66}" type="datetimeFigureOut">
               <a:rPr lang="en-US" smtClean="0"/>
               <a:pPr/>
-              <a:t>7/15/2020</a:t>
+              <a:t>10/23/2021</a:t>
             </a:fld>
             <a:endParaRPr lang="en-US"/>
           </a:p>
@@ -3239,14 +3239,14 @@
               <a:t>篇 </a:t>
             </a:r>
             <a:r>
-              <a:rPr lang="en-US" altLang="zh-CN" b="1" dirty="0" smtClean="0">
+              <a:rPr lang="en-US" altLang="zh-CN" b="1" smtClean="0">
                 <a:solidFill>
                   <a:srgbClr val="000066"/>
                 </a:solidFill>
                 <a:latin typeface="微軟正黑體" pitchFamily="34" charset="-120"/>
                 <a:ea typeface="微軟正黑體" pitchFamily="34" charset="-120"/>
               </a:rPr>
-              <a:t>84</a:t>
+              <a:t> 84</a:t>
             </a:r>
             <a:endParaRPr lang="en-US" b="1" dirty="0">
               <a:solidFill>
@@ -3330,7 +3330,47 @@
                 <a:latin typeface="微軟正黑體" pitchFamily="34" charset="-120"/>
                 <a:ea typeface="微軟正黑體" pitchFamily="34" charset="-120"/>
               </a:rPr>
-              <a:t>軍之耶和華啊，你的居所何等可愛！</a:t>
+              <a:t>軍之耶和華啊</a:t>
+            </a:r>
+            <a:r>
+              <a:rPr lang="zh-TW" altLang="en-US" sz="6400" dirty="0" smtClean="0">
+                <a:solidFill>
+                  <a:srgbClr val="660033"/>
+                </a:solidFill>
+                <a:latin typeface="微軟正黑體" pitchFamily="34" charset="-120"/>
+                <a:ea typeface="微軟正黑體" pitchFamily="34" charset="-120"/>
+              </a:rPr>
+              <a:t>，</a:t>
+            </a:r>
+            <a:r>
+              <a:rPr lang="zh-CN" altLang="en-US" sz="6400" dirty="0" smtClean="0">
+                <a:solidFill>
+                  <a:srgbClr val="660033"/>
+                </a:solidFill>
+                <a:latin typeface="微軟正黑體" pitchFamily="34" charset="-120"/>
+                <a:ea typeface="微軟正黑體" pitchFamily="34" charset="-120"/>
+              </a:rPr>
+              <a:t>袮</a:t>
+            </a:r>
+            <a:r>
+              <a:rPr lang="zh-TW" altLang="en-US" sz="6400" dirty="0" smtClean="0">
+                <a:solidFill>
+                  <a:srgbClr val="660033"/>
+                </a:solidFill>
+                <a:latin typeface="微軟正黑體" pitchFamily="34" charset="-120"/>
+                <a:ea typeface="微軟正黑體" pitchFamily="34" charset="-120"/>
+              </a:rPr>
+              <a:t>的</a:t>
+            </a:r>
+            <a:r>
+              <a:rPr lang="zh-TW" altLang="en-US" sz="6400" dirty="0">
+                <a:solidFill>
+                  <a:srgbClr val="660033"/>
+                </a:solidFill>
+                <a:latin typeface="微軟正黑體" pitchFamily="34" charset="-120"/>
+                <a:ea typeface="微軟正黑體" pitchFamily="34" charset="-120"/>
+              </a:rPr>
+              <a:t>居所何等可愛！</a:t>
             </a:r>
             <a:r>
               <a:rPr lang="en-US" altLang="zh-TW" sz="6400" dirty="0">
@@ -3447,7 +3487,47 @@
                 <a:latin typeface="微軟正黑體" pitchFamily="34" charset="-120"/>
                 <a:ea typeface="微軟正黑體" pitchFamily="34" charset="-120"/>
               </a:rPr>
-              <a:t>軍之耶和華我的王，我的神啊，在你祭壇那裡，麻雀為自己找著房屋，燕子為自己找著菢雛之窩。</a:t>
+              <a:t>軍之耶和華我的王，我的神啊，</a:t>
+            </a:r>
+            <a:r>
+              <a:rPr lang="zh-TW" altLang="en-US" sz="6400" dirty="0" smtClean="0">
+                <a:solidFill>
+                  <a:srgbClr val="660033"/>
+                </a:solidFill>
+                <a:latin typeface="微軟正黑體" pitchFamily="34" charset="-120"/>
+                <a:ea typeface="微軟正黑體" pitchFamily="34" charset="-120"/>
+              </a:rPr>
+              <a:t>在</a:t>
+            </a:r>
+            <a:r>
+              <a:rPr lang="zh-CN" altLang="en-US" sz="6400" dirty="0">
+                <a:solidFill>
+                  <a:srgbClr val="660033"/>
+                </a:solidFill>
+                <a:latin typeface="微軟正黑體" pitchFamily="34" charset="-120"/>
+                <a:ea typeface="微軟正黑體" pitchFamily="34" charset="-120"/>
+              </a:rPr>
+              <a:t>袮</a:t>
+            </a:r>
+            <a:r>
+              <a:rPr lang="zh-TW" altLang="en-US" sz="6400" dirty="0" smtClean="0">
+                <a:solidFill>
+                  <a:srgbClr val="660033"/>
+                </a:solidFill>
+                <a:latin typeface="微軟正黑體" pitchFamily="34" charset="-120"/>
+                <a:ea typeface="微軟正黑體" pitchFamily="34" charset="-120"/>
+              </a:rPr>
+              <a:t>祭</a:t>
+            </a:r>
+            <a:r>
+              <a:rPr lang="zh-TW" altLang="en-US" sz="6400" dirty="0">
+                <a:solidFill>
+                  <a:srgbClr val="660033"/>
+                </a:solidFill>
+                <a:latin typeface="微軟正黑體" pitchFamily="34" charset="-120"/>
+                <a:ea typeface="微軟正黑體" pitchFamily="34" charset="-120"/>
+              </a:rPr>
+              <a:t>壇那裡，麻雀為自己找著房屋，燕子為自己找著菢雛之窩。</a:t>
             </a:r>
             <a:r>
               <a:rPr lang="en-US" altLang="zh-TW" sz="6400" dirty="0">
@@ -3479,7 +3559,77 @@
                 <a:latin typeface="微軟正黑體" pitchFamily="34" charset="-120"/>
                 <a:ea typeface="微軟正黑體" pitchFamily="34" charset="-120"/>
               </a:rPr>
-              <a:t>此住在你殿中的便為有福！他們仍要讚美你。</a:t>
+              <a:t>此住</a:t>
+            </a:r>
+            <a:r>
+              <a:rPr lang="zh-TW" altLang="en-US" sz="6400" b="1" dirty="0" smtClean="0">
+                <a:solidFill>
+                  <a:srgbClr val="660033"/>
+                </a:solidFill>
+                <a:latin typeface="微軟正黑體" pitchFamily="34" charset="-120"/>
+                <a:ea typeface="微軟正黑體" pitchFamily="34" charset="-120"/>
+              </a:rPr>
+              <a:t>在</a:t>
+            </a:r>
+            <a:r>
+              <a:rPr lang="zh-CN" altLang="en-US" sz="6400" b="1" dirty="0">
+                <a:solidFill>
+                  <a:srgbClr val="660033"/>
+                </a:solidFill>
+                <a:latin typeface="微軟正黑體" pitchFamily="34" charset="-120"/>
+                <a:ea typeface="微軟正黑體" pitchFamily="34" charset="-120"/>
+              </a:rPr>
+              <a:t>袮</a:t>
+            </a:r>
+            <a:r>
+              <a:rPr lang="zh-TW" altLang="en-US" sz="6400" b="1" dirty="0" smtClean="0">
+                <a:solidFill>
+                  <a:srgbClr val="660033"/>
+                </a:solidFill>
+                <a:latin typeface="微軟正黑體" pitchFamily="34" charset="-120"/>
+                <a:ea typeface="微軟正黑體" pitchFamily="34" charset="-120"/>
+              </a:rPr>
+              <a:t>殿</a:t>
+            </a:r>
+            <a:r>
+              <a:rPr lang="zh-TW" altLang="en-US" sz="6400" b="1" dirty="0">
+                <a:solidFill>
+                  <a:srgbClr val="660033"/>
+                </a:solidFill>
+                <a:latin typeface="微軟正黑體" pitchFamily="34" charset="-120"/>
+                <a:ea typeface="微軟正黑體" pitchFamily="34" charset="-120"/>
+              </a:rPr>
+              <a:t>中的便為有福！他們仍要讚</a:t>
+            </a:r>
+            <a:r>
+              <a:rPr lang="zh-TW" altLang="en-US" sz="6400" b="1" dirty="0">
+                <a:solidFill>
+                  <a:srgbClr val="660033"/>
+                </a:solidFill>
+                <a:latin typeface="微軟正黑體" pitchFamily="34" charset="-120"/>
+                <a:ea typeface="微軟正黑體" pitchFamily="34" charset="-120"/>
+              </a:rPr>
+              <a:t>美</a:t>
+            </a:r>
+            <a:r>
+              <a:rPr lang="zh-CN" altLang="en-US" sz="6400" b="1" dirty="0">
+                <a:solidFill>
+                  <a:srgbClr val="660033"/>
+                </a:solidFill>
+                <a:latin typeface="微軟正黑體" pitchFamily="34" charset="-120"/>
+                <a:ea typeface="微軟正黑體" pitchFamily="34" charset="-120"/>
+              </a:rPr>
+              <a:t>袮</a:t>
+            </a:r>
+            <a:r>
+              <a:rPr lang="zh-TW" altLang="en-US" sz="6400" b="1" dirty="0" smtClean="0">
+                <a:solidFill>
+                  <a:srgbClr val="660033"/>
+                </a:solidFill>
+                <a:latin typeface="微軟正黑體" pitchFamily="34" charset="-120"/>
+                <a:ea typeface="微軟正黑體" pitchFamily="34" charset="-120"/>
+              </a:rPr>
+              <a:t>。</a:t>
             </a:r>
             <a:endParaRPr lang="en-US" altLang="zh-TW" sz="6400" b="1" dirty="0">
               <a:solidFill>
@@ -3554,6 +3704,26 @@
               <a:t>靠</a:t>
             </a:r>
             <a:r>
+              <a:rPr lang="zh-CN" altLang="en-US" sz="6400" dirty="0">
+                <a:solidFill>
+                  <a:srgbClr val="660033"/>
+                </a:solidFill>
+                <a:latin typeface="微軟正黑體" pitchFamily="34" charset="-120"/>
+                <a:ea typeface="微軟正黑體" pitchFamily="34" charset="-120"/>
+              </a:rPr>
+              <a:t>袮</a:t>
+            </a:r>
+            <a:r>
+              <a:rPr lang="zh-TW" altLang="en-US" sz="6400" dirty="0" smtClean="0">
+                <a:solidFill>
+                  <a:srgbClr val="660033"/>
+                </a:solidFill>
+                <a:latin typeface="微軟正黑體" pitchFamily="34" charset="-120"/>
+                <a:ea typeface="微軟正黑體" pitchFamily="34" charset="-120"/>
+              </a:rPr>
+              <a:t>有</a:t>
+            </a:r>
+            <a:r>
               <a:rPr lang="zh-TW" altLang="en-US" sz="6400" dirty="0">
                 <a:solidFill>
                   <a:srgbClr val="660033"/>
@@ -3561,7 +3731,7 @@
                 <a:latin typeface="微軟正黑體" pitchFamily="34" charset="-120"/>
                 <a:ea typeface="微軟正黑體" pitchFamily="34" charset="-120"/>
               </a:rPr>
-              <a:t>你有力量、心中想往錫安大道的，這人便為有福！</a:t>
+              <a:t>力量、心中想往錫安大道的，這人便為有福！</a:t>
             </a:r>
             <a:r>
               <a:rPr lang="en-US" altLang="zh-TW" sz="6400" dirty="0">
@@ -3668,17 +3838,7 @@
                 <a:latin typeface="微軟正黑體" pitchFamily="34" charset="-120"/>
                 <a:ea typeface="微軟正黑體" pitchFamily="34" charset="-120"/>
               </a:rPr>
-              <a:t>他</a:t>
-            </a:r>
-            <a:r>
-              <a:rPr lang="zh-TW" altLang="en-US" sz="6400" dirty="0">
-                <a:solidFill>
-                  <a:srgbClr val="660033"/>
-                </a:solidFill>
-                <a:latin typeface="微軟正黑體" pitchFamily="34" charset="-120"/>
-                <a:ea typeface="微軟正黑體" pitchFamily="34" charset="-120"/>
-              </a:rPr>
-              <a:t>們行走，力上加力，各人到錫安朝見神。</a:t>
+              <a:t>他們行走，力上加力，各人到錫安朝見神。</a:t>
             </a:r>
             <a:r>
               <a:rPr lang="en-US" altLang="zh-TW" sz="6400" dirty="0">
@@ -3700,7 +3860,7 @@
                 <a:latin typeface="微軟正黑體" pitchFamily="34" charset="-120"/>
                 <a:ea typeface="微軟正黑體" pitchFamily="34" charset="-120"/>
               </a:rPr>
-              <a:t>耶</a:t>
+              <a:t>耶和華萬軍之神啊，</a:t>
             </a:r>
             <a:r>
               <a:rPr lang="zh-TW" altLang="en-US" sz="6400" b="1" dirty="0">
@@ -3710,7 +3870,77 @@
                 <a:latin typeface="微軟正黑體" pitchFamily="34" charset="-120"/>
                 <a:ea typeface="微軟正黑體" pitchFamily="34" charset="-120"/>
               </a:rPr>
-              <a:t>和華萬軍之神啊，求你聽我的禱告！雅各的神啊，求你留心聽！</a:t>
+              <a:t>求</a:t>
+            </a:r>
+            <a:r>
+              <a:rPr lang="zh-CN" altLang="en-US" sz="6400" b="1" dirty="0">
+                <a:solidFill>
+                  <a:srgbClr val="660033"/>
+                </a:solidFill>
+                <a:latin typeface="微軟正黑體" pitchFamily="34" charset="-120"/>
+                <a:ea typeface="微軟正黑體" pitchFamily="34" charset="-120"/>
+              </a:rPr>
+              <a:t>袮</a:t>
+            </a:r>
+            <a:r>
+              <a:rPr lang="zh-TW" altLang="en-US" sz="6400" b="1" dirty="0">
+                <a:solidFill>
+                  <a:srgbClr val="660033"/>
+                </a:solidFill>
+                <a:latin typeface="微軟正黑體" pitchFamily="34" charset="-120"/>
+                <a:ea typeface="微軟正黑體" pitchFamily="34" charset="-120"/>
+              </a:rPr>
+              <a:t>聽</a:t>
+            </a:r>
+            <a:r>
+              <a:rPr lang="zh-TW" altLang="en-US" sz="6400" b="1" dirty="0">
+                <a:solidFill>
+                  <a:srgbClr val="660033"/>
+                </a:solidFill>
+                <a:latin typeface="微軟正黑體" pitchFamily="34" charset="-120"/>
+                <a:ea typeface="微軟正黑體" pitchFamily="34" charset="-120"/>
+              </a:rPr>
+              <a:t>我的禱告！雅各的神啊，</a:t>
+            </a:r>
+            <a:r>
+              <a:rPr lang="zh-TW" altLang="en-US" sz="6400" b="1" dirty="0">
+                <a:solidFill>
+                  <a:srgbClr val="660033"/>
+                </a:solidFill>
+                <a:latin typeface="微軟正黑體" pitchFamily="34" charset="-120"/>
+                <a:ea typeface="微軟正黑體" pitchFamily="34" charset="-120"/>
+              </a:rPr>
+              <a:t>求</a:t>
+            </a:r>
+            <a:r>
+              <a:rPr lang="zh-CN" altLang="en-US" sz="6400" b="1" dirty="0">
+                <a:solidFill>
+                  <a:srgbClr val="660033"/>
+                </a:solidFill>
+                <a:latin typeface="微軟正黑體" pitchFamily="34" charset="-120"/>
+                <a:ea typeface="微軟正黑體" pitchFamily="34" charset="-120"/>
+              </a:rPr>
+              <a:t>袮</a:t>
+            </a:r>
+            <a:r>
+              <a:rPr lang="zh-TW" altLang="en-US" sz="6400" b="1" dirty="0" smtClean="0">
+                <a:solidFill>
+                  <a:srgbClr val="660033"/>
+                </a:solidFill>
+                <a:latin typeface="微軟正黑體" pitchFamily="34" charset="-120"/>
+                <a:ea typeface="微軟正黑體" pitchFamily="34" charset="-120"/>
+              </a:rPr>
+              <a:t>留</a:t>
+            </a:r>
+            <a:r>
+              <a:rPr lang="zh-TW" altLang="en-US" sz="6400" b="1" dirty="0">
+                <a:solidFill>
+                  <a:srgbClr val="660033"/>
+                </a:solidFill>
+                <a:latin typeface="微軟正黑體" pitchFamily="34" charset="-120"/>
+                <a:ea typeface="微軟正黑體" pitchFamily="34" charset="-120"/>
+              </a:rPr>
+              <a:t>心聽！</a:t>
             </a:r>
             <a:endParaRPr lang="en-US" altLang="zh-TW" sz="6400" b="1" dirty="0">
               <a:solidFill>
@@ -3792,7 +4022,127 @@
                 <a:latin typeface="微軟正黑體" pitchFamily="34" charset="-120"/>
                 <a:ea typeface="微軟正黑體" pitchFamily="34" charset="-120"/>
               </a:rPr>
-              <a:t>啊，你是我們的盾牌；求你垂顧觀看你受膏者的面</a:t>
+              <a:t>啊</a:t>
+            </a:r>
+            <a:r>
+              <a:rPr lang="zh-TW" altLang="en-US" sz="6400" dirty="0" smtClean="0">
+                <a:solidFill>
+                  <a:srgbClr val="660033"/>
+                </a:solidFill>
+                <a:latin typeface="微軟正黑體" pitchFamily="34" charset="-120"/>
+                <a:ea typeface="微軟正黑體" pitchFamily="34" charset="-120"/>
+              </a:rPr>
+              <a:t>，</a:t>
+            </a:r>
+            <a:r>
+              <a:rPr lang="zh-CN" altLang="en-US" sz="6400" dirty="0">
+                <a:solidFill>
+                  <a:srgbClr val="660033"/>
+                </a:solidFill>
+                <a:latin typeface="微軟正黑體" pitchFamily="34" charset="-120"/>
+                <a:ea typeface="微軟正黑體" pitchFamily="34" charset="-120"/>
+              </a:rPr>
+              <a:t>袮</a:t>
+            </a:r>
+            <a:r>
+              <a:rPr lang="zh-TW" altLang="en-US" sz="6400" dirty="0" smtClean="0">
+                <a:solidFill>
+                  <a:srgbClr val="660033"/>
+                </a:solidFill>
+                <a:latin typeface="微軟正黑體" pitchFamily="34" charset="-120"/>
+                <a:ea typeface="微軟正黑體" pitchFamily="34" charset="-120"/>
+              </a:rPr>
+              <a:t>是</a:t>
+            </a:r>
+            <a:r>
+              <a:rPr lang="zh-TW" altLang="en-US" sz="6400" dirty="0">
+                <a:solidFill>
+                  <a:srgbClr val="660033"/>
+                </a:solidFill>
+                <a:latin typeface="微軟正黑體" pitchFamily="34" charset="-120"/>
+                <a:ea typeface="微軟正黑體" pitchFamily="34" charset="-120"/>
+              </a:rPr>
+              <a:t>我們的盾牌；</a:t>
+            </a:r>
+            <a:r>
+              <a:rPr lang="zh-TW" altLang="en-US" sz="6400" dirty="0" smtClean="0">
+                <a:solidFill>
+                  <a:srgbClr val="660033"/>
+                </a:solidFill>
+                <a:latin typeface="微軟正黑體" pitchFamily="34" charset="-120"/>
+                <a:ea typeface="微軟正黑體" pitchFamily="34" charset="-120"/>
+              </a:rPr>
+              <a:t>求</a:t>
+            </a:r>
+            <a:r>
+              <a:rPr lang="zh-CN" altLang="en-US" sz="6400" dirty="0">
+                <a:solidFill>
+                  <a:srgbClr val="660033"/>
+                </a:solidFill>
+                <a:latin typeface="微軟正黑體" pitchFamily="34" charset="-120"/>
+                <a:ea typeface="微軟正黑體" pitchFamily="34" charset="-120"/>
+              </a:rPr>
+              <a:t>袮</a:t>
+            </a:r>
+            <a:r>
+              <a:rPr lang="zh-TW" altLang="en-US" sz="6400" dirty="0" smtClean="0">
+                <a:solidFill>
+                  <a:srgbClr val="660033"/>
+                </a:solidFill>
+                <a:latin typeface="微軟正黑體" pitchFamily="34" charset="-120"/>
+                <a:ea typeface="微軟正黑體" pitchFamily="34" charset="-120"/>
+              </a:rPr>
+              <a:t>垂</a:t>
+            </a:r>
+            <a:r>
+              <a:rPr lang="zh-TW" altLang="en-US" sz="6400" dirty="0">
+                <a:solidFill>
+                  <a:srgbClr val="660033"/>
+                </a:solidFill>
+                <a:latin typeface="微軟正黑體" pitchFamily="34" charset="-120"/>
+                <a:ea typeface="微軟正黑體" pitchFamily="34" charset="-120"/>
+              </a:rPr>
+              <a:t>顧觀</a:t>
+            </a:r>
+            <a:r>
+              <a:rPr lang="zh-TW" altLang="en-US" sz="6400" dirty="0" smtClean="0">
+                <a:solidFill>
+                  <a:srgbClr val="660033"/>
+                </a:solidFill>
+                <a:latin typeface="微軟正黑體" pitchFamily="34" charset="-120"/>
+                <a:ea typeface="微軟正黑體" pitchFamily="34" charset="-120"/>
+              </a:rPr>
+              <a:t>看</a:t>
+            </a:r>
+            <a:r>
+              <a:rPr lang="zh-CN" altLang="en-US" sz="6400" dirty="0">
+                <a:solidFill>
+                  <a:srgbClr val="660033"/>
+                </a:solidFill>
+                <a:latin typeface="微軟正黑體" pitchFamily="34" charset="-120"/>
+                <a:ea typeface="微軟正黑體" pitchFamily="34" charset="-120"/>
+              </a:rPr>
+              <a:t>袮</a:t>
+            </a:r>
+            <a:r>
+              <a:rPr lang="zh-TW" altLang="en-US" sz="6400" dirty="0" smtClean="0">
+                <a:solidFill>
+                  <a:srgbClr val="660033"/>
+                </a:solidFill>
+                <a:latin typeface="微軟正黑體" pitchFamily="34" charset="-120"/>
+                <a:ea typeface="微軟正黑體" pitchFamily="34" charset="-120"/>
+              </a:rPr>
+              <a:t>受</a:t>
+            </a:r>
+            <a:r>
+              <a:rPr lang="zh-TW" altLang="en-US" sz="6400" dirty="0">
+                <a:solidFill>
+                  <a:srgbClr val="660033"/>
+                </a:solidFill>
+                <a:latin typeface="微軟正黑體" pitchFamily="34" charset="-120"/>
+                <a:ea typeface="微軟正黑體" pitchFamily="34" charset="-120"/>
+              </a:rPr>
+              <a:t>膏者的面</a:t>
             </a:r>
             <a:r>
               <a:rPr lang="zh-TW" altLang="en-US" sz="6400" dirty="0" smtClean="0">
@@ -3814,6 +4164,36 @@
           </a:p>
           <a:p>
             <a:r>
+              <a:rPr lang="zh-TW" altLang="en-US" sz="6400" b="1" dirty="0" smtClean="0">
+                <a:solidFill>
+                  <a:srgbClr val="660033"/>
+                </a:solidFill>
+                <a:latin typeface="微軟正黑體" pitchFamily="34" charset="-120"/>
+                <a:ea typeface="微軟正黑體" pitchFamily="34" charset="-120"/>
+              </a:rPr>
+              <a:t>在</a:t>
+            </a:r>
+            <a:r>
+              <a:rPr lang="zh-CN" altLang="en-US" sz="6400" dirty="0">
+                <a:solidFill>
+                  <a:srgbClr val="660033"/>
+                </a:solidFill>
+                <a:latin typeface="微軟正黑體" pitchFamily="34" charset="-120"/>
+                <a:ea typeface="微軟正黑體" pitchFamily="34" charset="-120"/>
+              </a:rPr>
+              <a:t>袮</a:t>
+            </a:r>
+            <a:r>
+              <a:rPr lang="zh-TW" altLang="en-US" sz="6400" b="1" dirty="0" smtClean="0">
+                <a:solidFill>
+                  <a:srgbClr val="660033"/>
+                </a:solidFill>
+                <a:latin typeface="微軟正黑體" pitchFamily="34" charset="-120"/>
+                <a:ea typeface="微軟正黑體" pitchFamily="34" charset="-120"/>
+              </a:rPr>
+              <a:t>的</a:t>
+            </a:r>
+            <a:r>
               <a:rPr lang="zh-TW" altLang="en-US" sz="6400" b="1" dirty="0">
                 <a:solidFill>
                   <a:srgbClr val="660033"/>
@@ -3821,17 +4201,7 @@
                 <a:latin typeface="微軟正黑體" pitchFamily="34" charset="-120"/>
                 <a:ea typeface="微軟正黑體" pitchFamily="34" charset="-120"/>
               </a:rPr>
-              <a:t>在</a:t>
-            </a:r>
-            <a:r>
-              <a:rPr lang="zh-TW" altLang="en-US" sz="6400" b="1" dirty="0">
-                <a:solidFill>
-                  <a:srgbClr val="660033"/>
-                </a:solidFill>
-                <a:latin typeface="微軟正黑體" pitchFamily="34" charset="-120"/>
-                <a:ea typeface="微軟正黑體" pitchFamily="34" charset="-120"/>
-              </a:rPr>
-              <a:t>你的院宇住一日，勝似在別處住千日；寧可在我神殿中看門，不願住在惡人的帳棚裡。</a:t>
+              <a:t>院宇住一日，勝似在別處住千日；寧可在我神殿中看門，不願住在惡人的帳棚裡。</a:t>
             </a:r>
             <a:r>
               <a:rPr lang="en-US" altLang="zh-TW" sz="6400" b="1" dirty="0">
@@ -3916,7 +4286,47 @@
                 <a:latin typeface="微軟正黑體" pitchFamily="34" charset="-120"/>
                 <a:ea typeface="微軟正黑體" pitchFamily="34" charset="-120"/>
               </a:rPr>
-              <a:t>為耶和華  神是日頭，是盾牌，要賜下恩惠和榮耀。他未嘗留下一樣好處不給那些行動正直的人。</a:t>
+              <a:t>為耶和華  神是日頭，是盾牌，要賜下恩惠和榮耀</a:t>
+            </a:r>
+            <a:r>
+              <a:rPr lang="zh-TW" altLang="en-US" sz="6400" dirty="0" smtClean="0">
+                <a:solidFill>
+                  <a:srgbClr val="660033"/>
+                </a:solidFill>
+                <a:latin typeface="微軟正黑體" pitchFamily="34" charset="-120"/>
+                <a:ea typeface="微軟正黑體" pitchFamily="34" charset="-120"/>
+              </a:rPr>
+              <a:t>。</a:t>
+            </a:r>
+            <a:r>
+              <a:rPr lang="zh-CN" altLang="en-US" sz="6400" dirty="0" smtClean="0">
+                <a:solidFill>
+                  <a:srgbClr val="660033"/>
+                </a:solidFill>
+                <a:latin typeface="微軟正黑體" pitchFamily="34" charset="-120"/>
+                <a:ea typeface="微軟正黑體" pitchFamily="34" charset="-120"/>
+              </a:rPr>
+              <a:t>祂</a:t>
+            </a:r>
+            <a:r>
+              <a:rPr lang="zh-TW" altLang="en-US" sz="6400" dirty="0" smtClean="0">
+                <a:solidFill>
+                  <a:srgbClr val="660033"/>
+                </a:solidFill>
+                <a:latin typeface="微軟正黑體" pitchFamily="34" charset="-120"/>
+                <a:ea typeface="微軟正黑體" pitchFamily="34" charset="-120"/>
+              </a:rPr>
+              <a:t>未</a:t>
+            </a:r>
+            <a:r>
+              <a:rPr lang="zh-TW" altLang="en-US" sz="6400" dirty="0">
+                <a:solidFill>
+                  <a:srgbClr val="660033"/>
+                </a:solidFill>
+                <a:latin typeface="微軟正黑體" pitchFamily="34" charset="-120"/>
+                <a:ea typeface="微軟正黑體" pitchFamily="34" charset="-120"/>
+              </a:rPr>
+              <a:t>嘗留下一樣好處不給那些行動正直的人。</a:t>
             </a:r>
             <a:endParaRPr lang="en-US" altLang="zh-TW" sz="6400" dirty="0">
               <a:solidFill>
@@ -3945,7 +4355,47 @@
                 <a:latin typeface="微軟正黑體" pitchFamily="34" charset="-120"/>
                 <a:ea typeface="微軟正黑體" pitchFamily="34" charset="-120"/>
               </a:rPr>
-              <a:t>軍之耶和華啊，倚靠你的人便為有福！</a:t>
+              <a:t>軍之耶和華啊，倚</a:t>
+            </a:r>
+            <a:r>
+              <a:rPr lang="zh-TW" altLang="en-US" sz="6400" b="1" dirty="0" smtClean="0">
+                <a:solidFill>
+                  <a:srgbClr val="660033"/>
+                </a:solidFill>
+                <a:latin typeface="微軟正黑體" pitchFamily="34" charset="-120"/>
+                <a:ea typeface="微軟正黑體" pitchFamily="34" charset="-120"/>
+              </a:rPr>
+              <a:t>靠</a:t>
+            </a:r>
+            <a:r>
+              <a:rPr lang="zh-CN" altLang="en-US" sz="6400" b="1" dirty="0">
+                <a:solidFill>
+                  <a:srgbClr val="660033"/>
+                </a:solidFill>
+                <a:latin typeface="微軟正黑體" pitchFamily="34" charset="-120"/>
+                <a:ea typeface="微軟正黑體" pitchFamily="34" charset="-120"/>
+              </a:rPr>
+              <a:t>袮</a:t>
+            </a:r>
+            <a:r>
+              <a:rPr lang="zh-TW" altLang="en-US" sz="6400" b="1" dirty="0" smtClean="0">
+                <a:solidFill>
+                  <a:srgbClr val="660033"/>
+                </a:solidFill>
+                <a:latin typeface="微軟正黑體" pitchFamily="34" charset="-120"/>
+                <a:ea typeface="微軟正黑體" pitchFamily="34" charset="-120"/>
+              </a:rPr>
+              <a:t>的</a:t>
+            </a:r>
+            <a:r>
+              <a:rPr lang="zh-TW" altLang="en-US" sz="6400" b="1" dirty="0">
+                <a:solidFill>
+                  <a:srgbClr val="660033"/>
+                </a:solidFill>
+                <a:latin typeface="微軟正黑體" pitchFamily="34" charset="-120"/>
+                <a:ea typeface="微軟正黑體" pitchFamily="34" charset="-120"/>
+              </a:rPr>
+              <a:t>人便為有福！</a:t>
             </a:r>
             <a:r>
               <a:rPr lang="en-US" altLang="zh-TW" sz="6400" b="1" dirty="0">

</xml_diff>